<commit_message>
Finalizing TB 2019 stuff
</commit_message>
<xml_diff>
--- a/presentations/PowerShell_Presentation.pptx
+++ b/presentations/PowerShell_Presentation.pptx
@@ -8494,7 +8494,10 @@
             <a:rPr lang="en-US" sz="2800" dirty="0" err="1"/>
             <a:t>Commandlets</a:t>
           </a:r>
-          <a:endParaRPr lang="en-US" sz="2800" dirty="0"/>
+          <a:r>
+            <a:rPr lang="en-US" sz="2800" dirty="0"/>
+            <a:t> + Parameters</a:t>
+          </a:r>
         </a:p>
       </dgm:t>
     </dgm:pt>
@@ -9279,7 +9282,7 @@
               <a:ea typeface="+mn-ea"/>
               <a:cs typeface="+mn-cs"/>
             </a:rPr>
-            <a:t>Up/Down arrows &amp; Ctrl + R</a:t>
+            <a:t>Up/Down arrows, Ctrl + R, Ctrl + C</a:t>
           </a:r>
         </a:p>
       </dgm:t>
@@ -12158,7 +12161,10 @@
             <a:rPr lang="en-US" sz="2800" kern="1200" dirty="0" err="1"/>
             <a:t>Commandlets</a:t>
           </a:r>
-          <a:endParaRPr lang="en-US" sz="2800" kern="1200" dirty="0"/>
+          <a:r>
+            <a:rPr lang="en-US" sz="2800" kern="1200" dirty="0"/>
+            <a:t> + Parameters</a:t>
+          </a:r>
         </a:p>
       </dsp:txBody>
       <dsp:txXfrm>
@@ -13885,7 +13891,7 @@
               <a:ea typeface="+mn-ea"/>
               <a:cs typeface="+mn-cs"/>
             </a:rPr>
-            <a:t>Up/Down arrows &amp; Ctrl + R</a:t>
+            <a:t>Up/Down arrows, Ctrl + R, Ctrl + C</a:t>
           </a:r>
         </a:p>
       </dsp:txBody>
@@ -29141,7 +29147,7 @@
           <a:p>
             <a:fld id="{01C460B3-1631-4DC9-97B7-F8761921B0CA}" type="datetimeFigureOut">
               <a:rPr lang="en-US" smtClean="0"/>
-              <a:t>11/9/2019</a:t>
+              <a:t>11/10/2019</a:t>
             </a:fld>
             <a:endParaRPr lang="en-US"/>
           </a:p>
@@ -29452,99 +29458,6 @@
           <a:bodyPr/>
           <a:lstStyle/>
           <a:p>
-            <a:pPr marL="514350" indent="-514350">
-              <a:buFont typeface="+mj-lt"/>
-              <a:buAutoNum type="arabicPeriod"/>
-            </a:pPr>
-            <a:r>
-              <a:rPr lang="en-US" dirty="0"/>
-              <a:t>It is POWERFUL</a:t>
-            </a:r>
-          </a:p>
-          <a:p>
-            <a:pPr lvl="1"/>
-            <a:r>
-              <a:rPr lang="en-US" dirty="0"/>
-              <a:t>Shell scripting faster than UI</a:t>
-            </a:r>
-          </a:p>
-          <a:p>
-            <a:pPr lvl="1"/>
-            <a:r>
-              <a:rPr lang="en-US" dirty="0"/>
-              <a:t>One-liners for complex tasks</a:t>
-            </a:r>
-          </a:p>
-          <a:p>
-            <a:pPr lvl="1"/>
-            <a:r>
-              <a:rPr lang="en-US" dirty="0"/>
-              <a:t>.NET, MS ecosystem fully integrated</a:t>
-            </a:r>
-          </a:p>
-          <a:p>
-            <a:pPr marL="514350" indent="-514350">
-              <a:buFont typeface="+mj-lt"/>
-              <a:buAutoNum type="arabicPeriod"/>
-            </a:pPr>
-            <a:r>
-              <a:rPr lang="en-US" dirty="0"/>
-              <a:t>It is EVERYWHERE</a:t>
-            </a:r>
-          </a:p>
-          <a:p>
-            <a:pPr lvl="1"/>
-            <a:r>
-              <a:rPr lang="en-US" dirty="0"/>
-              <a:t>All desktop &amp; server versions of Windows (XP+)</a:t>
-            </a:r>
-          </a:p>
-          <a:p>
-            <a:pPr lvl="1"/>
-            <a:r>
-              <a:rPr lang="en-US" dirty="0"/>
-              <a:t>In your tools (Visual Studio, VS Code)</a:t>
-            </a:r>
-          </a:p>
-          <a:p>
-            <a:pPr lvl="1"/>
-            <a:r>
-              <a:rPr lang="en-US" dirty="0"/>
-              <a:t>PowerShell Core supported for Mac OS, Linux</a:t>
-            </a:r>
-          </a:p>
-          <a:p>
-            <a:pPr marL="514350" indent="-514350">
-              <a:buFont typeface="+mj-lt"/>
-              <a:buAutoNum type="arabicPeriod"/>
-            </a:pPr>
-            <a:r>
-              <a:rPr lang="en-US" dirty="0"/>
-              <a:t>It is FAMILIAR</a:t>
-            </a:r>
-          </a:p>
-          <a:p>
-            <a:pPr lvl="1"/>
-            <a:r>
-              <a:rPr lang="en-US" dirty="0"/>
-              <a:t>Aliases support commands from other systems</a:t>
-            </a:r>
-          </a:p>
-          <a:p>
-            <a:pPr lvl="1"/>
-            <a:r>
-              <a:rPr lang="en-US" dirty="0"/>
-              <a:t>.NET and COM objects; </a:t>
-            </a:r>
-          </a:p>
-          <a:p>
-            <a:pPr lvl="1"/>
-            <a:r>
-              <a:rPr lang="en-US" dirty="0"/>
-              <a:t>Build your own PS “Swiss army knife”</a:t>
-            </a:r>
-          </a:p>
-          <a:p>
             <a:endParaRPr lang="en-US" dirty="0"/>
           </a:p>
         </p:txBody>
@@ -29732,7 +29645,7 @@
           <a:p>
             <a:fld id="{52A4E9ED-0ECB-4629-9B9B-99B6A934C592}" type="datetime1">
               <a:rPr lang="en-US" smtClean="0"/>
-              <a:t>11/9/2019</a:t>
+              <a:t>11/10/2019</a:t>
             </a:fld>
             <a:endParaRPr lang="en-US"/>
           </a:p>
@@ -29930,7 +29843,7 @@
           <a:p>
             <a:fld id="{1777C2C9-3B50-4973-81D4-E88A3F9E8BEF}" type="datetime1">
               <a:rPr lang="en-US" smtClean="0"/>
-              <a:t>11/9/2019</a:t>
+              <a:t>11/10/2019</a:t>
             </a:fld>
             <a:endParaRPr lang="en-US"/>
           </a:p>
@@ -30138,7 +30051,7 @@
           <a:p>
             <a:fld id="{0BD323A4-FF8B-4651-BDD8-70A677AD1E5E}" type="datetime1">
               <a:rPr lang="en-US" smtClean="0"/>
-              <a:t>11/9/2019</a:t>
+              <a:t>11/10/2019</a:t>
             </a:fld>
             <a:endParaRPr lang="en-US"/>
           </a:p>
@@ -30336,7 +30249,7 @@
           <a:p>
             <a:fld id="{3BD3484D-D555-498D-A67B-B9A5E4A2EDB5}" type="datetime1">
               <a:rPr lang="en-US" smtClean="0"/>
-              <a:t>11/9/2019</a:t>
+              <a:t>11/10/2019</a:t>
             </a:fld>
             <a:endParaRPr lang="en-US"/>
           </a:p>
@@ -30611,7 +30524,7 @@
           <a:p>
             <a:fld id="{AAE8FDE2-42B0-4675-9D27-0E72CF8FA9F8}" type="datetime1">
               <a:rPr lang="en-US" smtClean="0"/>
-              <a:t>11/9/2019</a:t>
+              <a:t>11/10/2019</a:t>
             </a:fld>
             <a:endParaRPr lang="en-US"/>
           </a:p>
@@ -30876,7 +30789,7 @@
           <a:p>
             <a:fld id="{7C184994-C499-41DB-B32B-438158ADBBB7}" type="datetime1">
               <a:rPr lang="en-US" smtClean="0"/>
-              <a:t>11/9/2019</a:t>
+              <a:t>11/10/2019</a:t>
             </a:fld>
             <a:endParaRPr lang="en-US"/>
           </a:p>
@@ -31288,7 +31201,7 @@
           <a:p>
             <a:fld id="{D6C32B28-75BE-4087-8A52-8F12C3F2B4D2}" type="datetime1">
               <a:rPr lang="en-US" smtClean="0"/>
-              <a:t>11/9/2019</a:t>
+              <a:t>11/10/2019</a:t>
             </a:fld>
             <a:endParaRPr lang="en-US"/>
           </a:p>
@@ -31429,7 +31342,7 @@
           <a:p>
             <a:fld id="{1F3DEDCD-1158-4D81-9597-0EFCB0A3039B}" type="datetime1">
               <a:rPr lang="en-US" smtClean="0"/>
-              <a:t>11/9/2019</a:t>
+              <a:t>11/10/2019</a:t>
             </a:fld>
             <a:endParaRPr lang="en-US"/>
           </a:p>
@@ -31542,7 +31455,7 @@
           <a:p>
             <a:fld id="{012CD382-5588-4845-A26F-62411455AE34}" type="datetime1">
               <a:rPr lang="en-US" smtClean="0"/>
-              <a:t>11/9/2019</a:t>
+              <a:t>11/10/2019</a:t>
             </a:fld>
             <a:endParaRPr lang="en-US"/>
           </a:p>
@@ -31853,7 +31766,7 @@
           <a:p>
             <a:fld id="{09073765-5658-4B75-8A1B-E5B7D2AAB837}" type="datetime1">
               <a:rPr lang="en-US" smtClean="0"/>
-              <a:t>11/9/2019</a:t>
+              <a:t>11/10/2019</a:t>
             </a:fld>
             <a:endParaRPr lang="en-US"/>
           </a:p>
@@ -32141,7 +32054,7 @@
           <a:p>
             <a:fld id="{DA22FB4C-3806-49AF-B8D2-3CE0C8C25B5F}" type="datetime1">
               <a:rPr lang="en-US" smtClean="0"/>
-              <a:t>11/9/2019</a:t>
+              <a:t>11/10/2019</a:t>
             </a:fld>
             <a:endParaRPr lang="en-US"/>
           </a:p>
@@ -32382,7 +32295,7 @@
           <a:p>
             <a:fld id="{6E8769B8-D71B-4AD7-9399-F73309B22C43}" type="datetime1">
               <a:rPr lang="en-US" smtClean="0"/>
-              <a:t>11/9/2019</a:t>
+              <a:t>11/10/2019</a:t>
             </a:fld>
             <a:endParaRPr lang="en-US"/>
           </a:p>
@@ -38956,7 +38869,7 @@
             <p:ph idx="1"/>
             <p:extLst>
               <p:ext uri="{D42A27DB-BD31-4B8C-83A1-F6EECF244321}">
-                <p14:modId xmlns:p14="http://schemas.microsoft.com/office/powerpoint/2010/main" val="3733833320"/>
+                <p14:modId xmlns:p14="http://schemas.microsoft.com/office/powerpoint/2010/main" val="3920308493"/>
               </p:ext>
             </p:extLst>
           </p:nvPr>
@@ -41145,7 +41058,7 @@
             <p:ph idx="1"/>
             <p:extLst>
               <p:ext uri="{D42A27DB-BD31-4B8C-83A1-F6EECF244321}">
-                <p14:modId xmlns:p14="http://schemas.microsoft.com/office/powerpoint/2010/main" val="3784413848"/>
+                <p14:modId xmlns:p14="http://schemas.microsoft.com/office/powerpoint/2010/main" val="789044377"/>
               </p:ext>
             </p:extLst>
           </p:nvPr>

</xml_diff>